<commit_message>
person master table 생성
</commit_message>
<xml_diff>
--- a/document/20.분석(AP)/AP-1070.표준 개발 지침/AP-1070.표준 개발 지침(Repository)_20210201_v1.0.pptx
+++ b/document/20.분석(AP)/AP-1070.표준 개발 지침/AP-1070.표준 개발 지침(Repository)_20210201_v1.0.pptx
@@ -19464,7 +19464,7 @@
         </p:nvSpPr>
         <p:spPr bwMode="auto">
           <a:xfrm>
-            <a:off x="143755" y="1152547"/>
+            <a:off x="149334" y="1169723"/>
             <a:ext cx="9435220" cy="5266202"/>
           </a:xfrm>
           <a:prstGeom prst="round2SameRect">
@@ -20330,14 +20330,54 @@
           <a:p>
             <a:pPr marL="0" lvl="1" algn="ctr"/>
             <a:r>
-              <a:rPr lang="en-US" altLang="ko-KR" sz="1300" dirty="0">
+              <a:rPr lang="en-US" altLang="ko-KR" sz="1300" dirty="0" err="1">
                 <a:solidFill>
                   <a:schemeClr val="tx1"/>
                 </a:solidFill>
                 <a:latin typeface="맑은 고딕" pitchFamily="50" charset="-127"/>
                 <a:ea typeface="맑은 고딕" pitchFamily="50" charset="-127"/>
               </a:rPr>
-              <a:t>auth</a:t>
+              <a:t>authApp</a:t>
+            </a:r>
+            <a:endParaRPr lang="en-US" altLang="ko-KR" sz="1300" dirty="0">
+              <a:solidFill>
+                <a:schemeClr val="tx1"/>
+              </a:solidFill>
+              <a:latin typeface="맑은 고딕" pitchFamily="50" charset="-127"/>
+              <a:ea typeface="맑은 고딕" pitchFamily="50" charset="-127"/>
+            </a:endParaRPr>
+          </a:p>
+          <a:p>
+            <a:pPr marL="0" lvl="1" algn="ctr"/>
+            <a:r>
+              <a:rPr lang="en-US" altLang="ko-KR" sz="1300" dirty="0">
+                <a:solidFill>
+                  <a:schemeClr val="tx1"/>
+                </a:solidFill>
+                <a:latin typeface="맑은 고딕" pitchFamily="50" charset="-127"/>
+                <a:ea typeface="맑은 고딕" pitchFamily="50" charset="-127"/>
+              </a:rPr>
+              <a:t>(</a:t>
+            </a:r>
+            <a:r>
+              <a:rPr lang="ko-KR" altLang="en-US" sz="1300" dirty="0">
+                <a:solidFill>
+                  <a:schemeClr val="tx1"/>
+                </a:solidFill>
+                <a:latin typeface="맑은 고딕" pitchFamily="50" charset="-127"/>
+                <a:ea typeface="맑은 고딕" pitchFamily="50" charset="-127"/>
+              </a:rPr>
+              <a:t>로그인</a:t>
+            </a:r>
+            <a:r>
+              <a:rPr lang="en-US" altLang="ko-KR" sz="1300" dirty="0">
+                <a:solidFill>
+                  <a:schemeClr val="tx1"/>
+                </a:solidFill>
+                <a:latin typeface="맑은 고딕" pitchFamily="50" charset="-127"/>
+                <a:ea typeface="맑은 고딕" pitchFamily="50" charset="-127"/>
+              </a:rPr>
+              <a:t>)</a:t>
             </a:r>
             <a:endParaRPr lang="ko-KR" altLang="en-US" sz="1300" dirty="0">
               <a:solidFill>
@@ -20467,7 +20507,7 @@
         </p:nvSpPr>
         <p:spPr bwMode="auto">
           <a:xfrm>
-            <a:off x="4636190" y="3856975"/>
+            <a:off x="4636190" y="4795229"/>
             <a:ext cx="2305295" cy="1285080"/>
           </a:xfrm>
           <a:prstGeom prst="rect">
@@ -20568,153 +20608,6 @@
           </a:p>
         </p:txBody>
       </p:sp>
-      <p:sp>
-        <p:nvSpPr>
-          <p:cNvPr id="38" name="Rectangle 16">
-            <a:extLst>
-              <a:ext uri="{FF2B5EF4-FFF2-40B4-BE49-F238E27FC236}">
-                <a16:creationId xmlns:a16="http://schemas.microsoft.com/office/drawing/2014/main" id="{A4119092-7277-4F2E-B129-9EA784003D30}"/>
-              </a:ext>
-            </a:extLst>
-          </p:cNvPr>
-          <p:cNvSpPr>
-            <a:spLocks noChangeArrowheads="1"/>
-          </p:cNvSpPr>
-          <p:nvPr/>
-        </p:nvSpPr>
-        <p:spPr bwMode="auto">
-          <a:xfrm>
-            <a:off x="4636190" y="5254279"/>
-            <a:ext cx="2305295" cy="368433"/>
-          </a:xfrm>
-          <a:prstGeom prst="rect">
-            <a:avLst/>
-          </a:prstGeom>
-          <a:solidFill>
-            <a:srgbClr val="4C98CC">
-              <a:alpha val="9000"/>
-            </a:srgbClr>
-          </a:solidFill>
-          <a:ln w="3175">
-            <a:solidFill>
-              <a:schemeClr val="tx1">
-                <a:lumMod val="50000"/>
-                <a:lumOff val="50000"/>
-              </a:schemeClr>
-            </a:solidFill>
-          </a:ln>
-        </p:spPr>
-        <p:style>
-          <a:lnRef idx="2">
-            <a:schemeClr val="accent1">
-              <a:shade val="50000"/>
-            </a:schemeClr>
-          </a:lnRef>
-          <a:fillRef idx="1">
-            <a:schemeClr val="accent1"/>
-          </a:fillRef>
-          <a:effectRef idx="0">
-            <a:schemeClr val="accent1"/>
-          </a:effectRef>
-          <a:fontRef idx="minor">
-            <a:schemeClr val="lt1"/>
-          </a:fontRef>
-        </p:style>
-        <p:txBody>
-          <a:bodyPr anchor="ctr"/>
-          <a:lstStyle/>
-          <a:p>
-            <a:pPr marL="0" lvl="1" algn="ctr"/>
-            <a:r>
-              <a:rPr lang="ko-KR" altLang="en-US" sz="1300" dirty="0">
-                <a:solidFill>
-                  <a:schemeClr val="tx1"/>
-                </a:solidFill>
-                <a:latin typeface="맑은 고딕" pitchFamily="50" charset="-127"/>
-                <a:ea typeface="맑은 고딕" pitchFamily="50" charset="-127"/>
-              </a:rPr>
-              <a:t>질의응답</a:t>
-            </a:r>
-          </a:p>
-        </p:txBody>
-      </p:sp>
-      <p:sp>
-        <p:nvSpPr>
-          <p:cNvPr id="39" name="Rectangle 16">
-            <a:extLst>
-              <a:ext uri="{FF2B5EF4-FFF2-40B4-BE49-F238E27FC236}">
-                <a16:creationId xmlns:a16="http://schemas.microsoft.com/office/drawing/2014/main" id="{73D1E47F-72CA-443A-908F-218FA02AE12A}"/>
-              </a:ext>
-            </a:extLst>
-          </p:cNvPr>
-          <p:cNvSpPr>
-            <a:spLocks noChangeArrowheads="1"/>
-          </p:cNvSpPr>
-          <p:nvPr/>
-        </p:nvSpPr>
-        <p:spPr bwMode="auto">
-          <a:xfrm>
-            <a:off x="4636190" y="5708973"/>
-            <a:ext cx="2305295" cy="368433"/>
-          </a:xfrm>
-          <a:prstGeom prst="rect">
-            <a:avLst/>
-          </a:prstGeom>
-          <a:solidFill>
-            <a:srgbClr val="4C98CC">
-              <a:alpha val="9000"/>
-            </a:srgbClr>
-          </a:solidFill>
-          <a:ln w="3175">
-            <a:solidFill>
-              <a:schemeClr val="tx1">
-                <a:lumMod val="50000"/>
-                <a:lumOff val="50000"/>
-              </a:schemeClr>
-            </a:solidFill>
-          </a:ln>
-        </p:spPr>
-        <p:style>
-          <a:lnRef idx="2">
-            <a:schemeClr val="accent1">
-              <a:shade val="50000"/>
-            </a:schemeClr>
-          </a:lnRef>
-          <a:fillRef idx="1">
-            <a:schemeClr val="accent1"/>
-          </a:fillRef>
-          <a:effectRef idx="0">
-            <a:schemeClr val="accent1"/>
-          </a:effectRef>
-          <a:fontRef idx="minor">
-            <a:schemeClr val="lt1"/>
-          </a:fontRef>
-        </p:style>
-        <p:txBody>
-          <a:bodyPr anchor="ctr"/>
-          <a:lstStyle/>
-          <a:p>
-            <a:pPr marL="0" lvl="1" algn="ctr"/>
-            <a:r>
-              <a:rPr lang="en-US" altLang="ko-KR" sz="1300" dirty="0">
-                <a:solidFill>
-                  <a:schemeClr val="tx1"/>
-                </a:solidFill>
-                <a:latin typeface="맑은 고딕" pitchFamily="50" charset="-127"/>
-                <a:ea typeface="맑은 고딕" pitchFamily="50" charset="-127"/>
-              </a:rPr>
-              <a:t>…</a:t>
-            </a:r>
-            <a:endParaRPr lang="ko-KR" altLang="en-US" sz="1300" dirty="0">
-              <a:solidFill>
-                <a:schemeClr val="tx1"/>
-              </a:solidFill>
-              <a:latin typeface="맑은 고딕" pitchFamily="50" charset="-127"/>
-              <a:ea typeface="맑은 고딕" pitchFamily="50" charset="-127"/>
-            </a:endParaRPr>
-          </a:p>
-        </p:txBody>
-      </p:sp>
       <p:cxnSp>
         <p:nvCxnSpPr>
           <p:cNvPr id="42" name="연결선: 꺾임 41">
@@ -20727,7 +20620,6 @@
           <p:cNvCxnSpPr>
             <a:cxnSpLocks/>
             <a:stCxn id="22" idx="3"/>
-            <a:endCxn id="39" idx="1"/>
           </p:cNvCxnSpPr>
           <p:nvPr/>
         </p:nvCxnSpPr>
@@ -20739,57 +20631,6 @@
           <a:prstGeom prst="bentConnector3">
             <a:avLst>
               <a:gd name="adj1" fmla="val 50000"/>
-            </a:avLst>
-          </a:prstGeom>
-          <a:ln>
-            <a:headEnd type="none" w="med" len="med"/>
-            <a:tailEnd type="triangle"/>
-          </a:ln>
-          <a:effectLst>
-            <a:outerShdw dist="35921" dir="2700000" algn="ctr" rotWithShape="0">
-              <a:schemeClr val="bg2"/>
-            </a:outerShdw>
-          </a:effectLst>
-        </p:spPr>
-        <p:style>
-          <a:lnRef idx="2">
-            <a:schemeClr val="dk1"/>
-          </a:lnRef>
-          <a:fillRef idx="0">
-            <a:schemeClr val="dk1"/>
-          </a:fillRef>
-          <a:effectRef idx="1">
-            <a:schemeClr val="dk1"/>
-          </a:effectRef>
-          <a:fontRef idx="minor">
-            <a:schemeClr val="tx1"/>
-          </a:fontRef>
-        </p:style>
-      </p:cxnSp>
-      <p:cxnSp>
-        <p:nvCxnSpPr>
-          <p:cNvPr id="45" name="연결선: 꺾임 44">
-            <a:extLst>
-              <a:ext uri="{FF2B5EF4-FFF2-40B4-BE49-F238E27FC236}">
-                <a16:creationId xmlns:a16="http://schemas.microsoft.com/office/drawing/2014/main" id="{548423B1-F82A-495A-B850-6EF7DAE1D4B6}"/>
-              </a:ext>
-            </a:extLst>
-          </p:cNvPr>
-          <p:cNvCxnSpPr>
-            <a:cxnSpLocks/>
-            <a:stCxn id="18" idx="1"/>
-            <a:endCxn id="23" idx="1"/>
-          </p:cNvCxnSpPr>
-          <p:nvPr/>
-        </p:nvCxnSpPr>
-        <p:spPr bwMode="auto">
-          <a:xfrm rot="10800000" flipH="1" flipV="1">
-            <a:off x="2429705" y="3489085"/>
-            <a:ext cx="600326" cy="1386709"/>
-          </a:xfrm>
-          <a:prstGeom prst="bentConnector3">
-            <a:avLst>
-              <a:gd name="adj1" fmla="val -38079"/>
             </a:avLst>
           </a:prstGeom>
           <a:ln>
@@ -20894,6 +20735,57 @@
           </a:p>
         </p:txBody>
       </p:sp>
+      <p:cxnSp>
+        <p:nvCxnSpPr>
+          <p:cNvPr id="45" name="연결선: 꺾임 44">
+            <a:extLst>
+              <a:ext uri="{FF2B5EF4-FFF2-40B4-BE49-F238E27FC236}">
+                <a16:creationId xmlns:a16="http://schemas.microsoft.com/office/drawing/2014/main" id="{548423B1-F82A-495A-B850-6EF7DAE1D4B6}"/>
+              </a:ext>
+            </a:extLst>
+          </p:cNvPr>
+          <p:cNvCxnSpPr>
+            <a:cxnSpLocks/>
+            <a:stCxn id="18" idx="1"/>
+            <a:endCxn id="23" idx="1"/>
+          </p:cNvCxnSpPr>
+          <p:nvPr/>
+        </p:nvCxnSpPr>
+        <p:spPr bwMode="auto">
+          <a:xfrm rot="10800000" flipH="1" flipV="1">
+            <a:off x="2429705" y="3489085"/>
+            <a:ext cx="600326" cy="1386709"/>
+          </a:xfrm>
+          <a:prstGeom prst="bentConnector3">
+            <a:avLst>
+              <a:gd name="adj1" fmla="val -38079"/>
+            </a:avLst>
+          </a:prstGeom>
+          <a:ln>
+            <a:headEnd type="none" w="med" len="med"/>
+            <a:tailEnd type="triangle"/>
+          </a:ln>
+          <a:effectLst>
+            <a:outerShdw dist="35921" dir="2700000" algn="ctr" rotWithShape="0">
+              <a:schemeClr val="bg2"/>
+            </a:outerShdw>
+          </a:effectLst>
+        </p:spPr>
+        <p:style>
+          <a:lnRef idx="2">
+            <a:schemeClr val="dk1"/>
+          </a:lnRef>
+          <a:fillRef idx="0">
+            <a:schemeClr val="dk1"/>
+          </a:fillRef>
+          <a:effectRef idx="1">
+            <a:schemeClr val="dk1"/>
+          </a:effectRef>
+          <a:fontRef idx="minor">
+            <a:schemeClr val="tx1"/>
+          </a:fontRef>
+        </p:style>
+      </p:cxnSp>
       <p:sp>
         <p:nvSpPr>
           <p:cNvPr id="51" name="Rectangle 16">
@@ -20910,7 +20802,7 @@
         </p:nvSpPr>
         <p:spPr bwMode="auto">
           <a:xfrm>
-            <a:off x="7017406" y="3856974"/>
+            <a:off x="7017406" y="4795228"/>
             <a:ext cx="2223314" cy="1285081"/>
           </a:xfrm>
           <a:prstGeom prst="rect">
@@ -21049,20 +20941,10 @@
                 <a:latin typeface="맑은 고딕" pitchFamily="50" charset="-127"/>
                 <a:ea typeface="맑은 고딕" pitchFamily="50" charset="-127"/>
               </a:rPr>
-              <a:t>esm_sys_1030</a:t>
+              <a:t>esm_sys_1030.</a:t>
             </a:r>
             <a:r>
-              <a:rPr lang="en-US" altLang="ko-KR" sz="1300">
-                <a:solidFill>
-                  <a:schemeClr val="tx1"/>
-                </a:solidFill>
-                <a:latin typeface="맑은 고딕" pitchFamily="50" charset="-127"/>
-                <a:ea typeface="맑은 고딕" pitchFamily="50" charset="-127"/>
-              </a:rPr>
-              <a:t>.</a:t>
-            </a:r>
-            <a:r>
-              <a:rPr lang="ko-KR" altLang="en-US" sz="1300">
+              <a:rPr lang="ko-KR" altLang="en-US" sz="1300" dirty="0" err="1">
                 <a:solidFill>
                   <a:schemeClr val="tx1"/>
                 </a:solidFill>
@@ -21070,160 +20952,6 @@
                 <a:ea typeface="맑은 고딕" pitchFamily="50" charset="-127"/>
               </a:rPr>
               <a:t>언어코드등록</a:t>
-            </a:r>
-            <a:endParaRPr lang="ko-KR" altLang="en-US" sz="1300" dirty="0">
-              <a:solidFill>
-                <a:schemeClr val="tx1"/>
-              </a:solidFill>
-              <a:latin typeface="맑은 고딕" pitchFamily="50" charset="-127"/>
-              <a:ea typeface="맑은 고딕" pitchFamily="50" charset="-127"/>
-            </a:endParaRPr>
-          </a:p>
-        </p:txBody>
-      </p:sp>
-      <p:sp>
-        <p:nvSpPr>
-          <p:cNvPr id="54" name="Rectangle 16">
-            <a:extLst>
-              <a:ext uri="{FF2B5EF4-FFF2-40B4-BE49-F238E27FC236}">
-                <a16:creationId xmlns:a16="http://schemas.microsoft.com/office/drawing/2014/main" id="{C88783D0-299F-45C3-B2B5-C4F614571D73}"/>
-              </a:ext>
-            </a:extLst>
-          </p:cNvPr>
-          <p:cNvSpPr>
-            <a:spLocks noChangeArrowheads="1"/>
-          </p:cNvSpPr>
-          <p:nvPr/>
-        </p:nvSpPr>
-        <p:spPr bwMode="auto">
-          <a:xfrm>
-            <a:off x="7017406" y="5254279"/>
-            <a:ext cx="2223314" cy="368433"/>
-          </a:xfrm>
-          <a:prstGeom prst="rect">
-            <a:avLst/>
-          </a:prstGeom>
-          <a:solidFill>
-            <a:srgbClr val="4C98CC">
-              <a:alpha val="9000"/>
-            </a:srgbClr>
-          </a:solidFill>
-          <a:ln w="3175">
-            <a:solidFill>
-              <a:schemeClr val="tx1">
-                <a:lumMod val="50000"/>
-                <a:lumOff val="50000"/>
-              </a:schemeClr>
-            </a:solidFill>
-          </a:ln>
-        </p:spPr>
-        <p:style>
-          <a:lnRef idx="2">
-            <a:schemeClr val="accent1">
-              <a:shade val="50000"/>
-            </a:schemeClr>
-          </a:lnRef>
-          <a:fillRef idx="1">
-            <a:schemeClr val="accent1"/>
-          </a:fillRef>
-          <a:effectRef idx="0">
-            <a:schemeClr val="accent1"/>
-          </a:effectRef>
-          <a:fontRef idx="minor">
-            <a:schemeClr val="lt1"/>
-          </a:fontRef>
-        </p:style>
-        <p:txBody>
-          <a:bodyPr anchor="ctr"/>
-          <a:lstStyle/>
-          <a:p>
-            <a:pPr marL="0" lvl="1" algn="ctr"/>
-            <a:r>
-              <a:rPr lang="en-US" altLang="ko-KR" sz="1300" dirty="0">
-                <a:solidFill>
-                  <a:schemeClr val="tx1"/>
-                </a:solidFill>
-                <a:latin typeface="맑은 고딕" pitchFamily="50" charset="-127"/>
-                <a:ea typeface="맑은 고딕" pitchFamily="50" charset="-127"/>
-              </a:rPr>
-              <a:t>…</a:t>
-            </a:r>
-            <a:endParaRPr lang="ko-KR" altLang="en-US" sz="1300" dirty="0">
-              <a:solidFill>
-                <a:schemeClr val="tx1"/>
-              </a:solidFill>
-              <a:latin typeface="맑은 고딕" pitchFamily="50" charset="-127"/>
-              <a:ea typeface="맑은 고딕" pitchFamily="50" charset="-127"/>
-            </a:endParaRPr>
-          </a:p>
-        </p:txBody>
-      </p:sp>
-      <p:sp>
-        <p:nvSpPr>
-          <p:cNvPr id="55" name="Rectangle 16">
-            <a:extLst>
-              <a:ext uri="{FF2B5EF4-FFF2-40B4-BE49-F238E27FC236}">
-                <a16:creationId xmlns:a16="http://schemas.microsoft.com/office/drawing/2014/main" id="{462D18F6-D251-4A67-80F1-F7B60F0D4EE7}"/>
-              </a:ext>
-            </a:extLst>
-          </p:cNvPr>
-          <p:cNvSpPr>
-            <a:spLocks noChangeArrowheads="1"/>
-          </p:cNvSpPr>
-          <p:nvPr/>
-        </p:nvSpPr>
-        <p:spPr bwMode="auto">
-          <a:xfrm>
-            <a:off x="7017406" y="5708973"/>
-            <a:ext cx="2223314" cy="368433"/>
-          </a:xfrm>
-          <a:prstGeom prst="rect">
-            <a:avLst/>
-          </a:prstGeom>
-          <a:solidFill>
-            <a:srgbClr val="4C98CC">
-              <a:alpha val="9000"/>
-            </a:srgbClr>
-          </a:solidFill>
-          <a:ln w="3175">
-            <a:solidFill>
-              <a:schemeClr val="tx1">
-                <a:lumMod val="50000"/>
-                <a:lumOff val="50000"/>
-              </a:schemeClr>
-            </a:solidFill>
-          </a:ln>
-        </p:spPr>
-        <p:style>
-          <a:lnRef idx="2">
-            <a:schemeClr val="accent1">
-              <a:shade val="50000"/>
-            </a:schemeClr>
-          </a:lnRef>
-          <a:fillRef idx="1">
-            <a:schemeClr val="accent1"/>
-          </a:fillRef>
-          <a:effectRef idx="0">
-            <a:schemeClr val="accent1"/>
-          </a:effectRef>
-          <a:fontRef idx="minor">
-            <a:schemeClr val="lt1"/>
-          </a:fontRef>
-        </p:style>
-        <p:txBody>
-          <a:bodyPr anchor="ctr"/>
-          <a:lstStyle/>
-          <a:p>
-            <a:pPr marL="0" lvl="1" algn="ctr"/>
-            <a:r>
-              <a:rPr lang="en-US" altLang="ko-KR" sz="1300" dirty="0">
-                <a:solidFill>
-                  <a:schemeClr val="tx1"/>
-                </a:solidFill>
-                <a:latin typeface="맑은 고딕" pitchFamily="50" charset="-127"/>
-                <a:ea typeface="맑은 고딕" pitchFamily="50" charset="-127"/>
-              </a:rPr>
-              <a:t>…</a:t>
             </a:r>
             <a:endParaRPr lang="ko-KR" altLang="en-US" sz="1300" dirty="0">
               <a:solidFill>
@@ -22068,6 +21796,193 @@
                 <a:ea typeface="맑은 고딕" pitchFamily="50" charset="-127"/>
               </a:rPr>
               <a:t>base.html</a:t>
+            </a:r>
+            <a:endParaRPr lang="ko-KR" altLang="en-US" sz="1300" dirty="0">
+              <a:solidFill>
+                <a:schemeClr val="tx1"/>
+              </a:solidFill>
+              <a:latin typeface="맑은 고딕" pitchFamily="50" charset="-127"/>
+              <a:ea typeface="맑은 고딕" pitchFamily="50" charset="-127"/>
+            </a:endParaRPr>
+          </a:p>
+        </p:txBody>
+      </p:sp>
+      <p:sp>
+        <p:nvSpPr>
+          <p:cNvPr id="36" name="Rectangle 16">
+            <a:extLst>
+              <a:ext uri="{FF2B5EF4-FFF2-40B4-BE49-F238E27FC236}">
+                <a16:creationId xmlns:a16="http://schemas.microsoft.com/office/drawing/2014/main" id="{5C861EA4-C1D6-4AD1-9A33-184EBD47D3E0}"/>
+              </a:ext>
+            </a:extLst>
+          </p:cNvPr>
+          <p:cNvSpPr>
+            <a:spLocks noChangeArrowheads="1"/>
+          </p:cNvSpPr>
+          <p:nvPr/>
+        </p:nvSpPr>
+        <p:spPr bwMode="auto">
+          <a:xfrm>
+            <a:off x="4636190" y="3802824"/>
+            <a:ext cx="2305295" cy="368433"/>
+          </a:xfrm>
+          <a:prstGeom prst="rect">
+            <a:avLst/>
+          </a:prstGeom>
+          <a:solidFill>
+            <a:srgbClr val="4C98CC">
+              <a:alpha val="9000"/>
+            </a:srgbClr>
+          </a:solidFill>
+          <a:ln w="3175">
+            <a:solidFill>
+              <a:schemeClr val="tx1">
+                <a:lumMod val="50000"/>
+                <a:lumOff val="50000"/>
+              </a:schemeClr>
+            </a:solidFill>
+          </a:ln>
+        </p:spPr>
+        <p:style>
+          <a:lnRef idx="2">
+            <a:schemeClr val="accent1">
+              <a:shade val="50000"/>
+            </a:schemeClr>
+          </a:lnRef>
+          <a:fillRef idx="1">
+            <a:schemeClr val="accent1"/>
+          </a:fillRef>
+          <a:effectRef idx="0">
+            <a:schemeClr val="accent1"/>
+          </a:effectRef>
+          <a:fontRef idx="minor">
+            <a:schemeClr val="lt1"/>
+          </a:fontRef>
+        </p:style>
+        <p:txBody>
+          <a:bodyPr anchor="ctr"/>
+          <a:lstStyle/>
+          <a:p>
+            <a:pPr marL="0" lvl="1" algn="ctr"/>
+            <a:r>
+              <a:rPr lang="en-US" altLang="ko-KR" sz="1300" dirty="0">
+                <a:solidFill>
+                  <a:schemeClr val="tx1"/>
+                </a:solidFill>
+                <a:latin typeface="맑은 고딕" pitchFamily="50" charset="-127"/>
+                <a:ea typeface="맑은 고딕" pitchFamily="50" charset="-127"/>
+              </a:rPr>
+              <a:t>templates</a:t>
+            </a:r>
+          </a:p>
+          <a:p>
+            <a:pPr marL="0" lvl="1" algn="ctr"/>
+            <a:r>
+              <a:rPr lang="en-US" altLang="ko-KR" sz="1300" dirty="0">
+                <a:solidFill>
+                  <a:schemeClr val="tx1"/>
+                </a:solidFill>
+                <a:latin typeface="맑은 고딕" pitchFamily="50" charset="-127"/>
+                <a:ea typeface="맑은 고딕" pitchFamily="50" charset="-127"/>
+              </a:rPr>
+              <a:t>(HTML </a:t>
+            </a:r>
+            <a:r>
+              <a:rPr lang="ko-KR" altLang="en-US" sz="1300" dirty="0">
+                <a:solidFill>
+                  <a:schemeClr val="tx1"/>
+                </a:solidFill>
+                <a:latin typeface="맑은 고딕" pitchFamily="50" charset="-127"/>
+                <a:ea typeface="맑은 고딕" pitchFamily="50" charset="-127"/>
+              </a:rPr>
+              <a:t>템플릿</a:t>
+            </a:r>
+            <a:r>
+              <a:rPr lang="en-US" altLang="ko-KR" sz="1300" dirty="0">
+                <a:solidFill>
+                  <a:schemeClr val="tx1"/>
+                </a:solidFill>
+                <a:latin typeface="맑은 고딕" pitchFamily="50" charset="-127"/>
+                <a:ea typeface="맑은 고딕" pitchFamily="50" charset="-127"/>
+              </a:rPr>
+              <a:t>)</a:t>
+            </a:r>
+            <a:endParaRPr lang="ko-KR" altLang="en-US" sz="1300" dirty="0">
+              <a:solidFill>
+                <a:schemeClr val="tx1"/>
+              </a:solidFill>
+              <a:latin typeface="맑은 고딕" pitchFamily="50" charset="-127"/>
+              <a:ea typeface="맑은 고딕" pitchFamily="50" charset="-127"/>
+            </a:endParaRPr>
+          </a:p>
+        </p:txBody>
+      </p:sp>
+      <p:sp>
+        <p:nvSpPr>
+          <p:cNvPr id="37" name="Rectangle 16">
+            <a:extLst>
+              <a:ext uri="{FF2B5EF4-FFF2-40B4-BE49-F238E27FC236}">
+                <a16:creationId xmlns:a16="http://schemas.microsoft.com/office/drawing/2014/main" id="{5116B281-51F5-44DC-A42F-4CC217FF959F}"/>
+              </a:ext>
+            </a:extLst>
+          </p:cNvPr>
+          <p:cNvSpPr>
+            <a:spLocks noChangeArrowheads="1"/>
+          </p:cNvSpPr>
+          <p:nvPr/>
+        </p:nvSpPr>
+        <p:spPr bwMode="auto">
+          <a:xfrm>
+            <a:off x="7017406" y="3802824"/>
+            <a:ext cx="2223314" cy="368433"/>
+          </a:xfrm>
+          <a:prstGeom prst="rect">
+            <a:avLst/>
+          </a:prstGeom>
+          <a:solidFill>
+            <a:srgbClr val="4C98CC">
+              <a:alpha val="9000"/>
+            </a:srgbClr>
+          </a:solidFill>
+          <a:ln w="3175">
+            <a:solidFill>
+              <a:schemeClr val="tx1">
+                <a:lumMod val="50000"/>
+                <a:lumOff val="50000"/>
+              </a:schemeClr>
+            </a:solidFill>
+          </a:ln>
+        </p:spPr>
+        <p:style>
+          <a:lnRef idx="2">
+            <a:schemeClr val="accent1">
+              <a:shade val="50000"/>
+            </a:schemeClr>
+          </a:lnRef>
+          <a:fillRef idx="1">
+            <a:schemeClr val="accent1"/>
+          </a:fillRef>
+          <a:effectRef idx="0">
+            <a:schemeClr val="accent1"/>
+          </a:effectRef>
+          <a:fontRef idx="minor">
+            <a:schemeClr val="lt1"/>
+          </a:fontRef>
+        </p:style>
+        <p:txBody>
+          <a:bodyPr anchor="ctr"/>
+          <a:lstStyle/>
+          <a:p>
+            <a:pPr marL="0" lvl="1" algn="ctr"/>
+            <a:r>
+              <a:rPr lang="en-US" altLang="ko-KR" sz="1300" dirty="0">
+                <a:solidFill>
+                  <a:schemeClr val="tx1"/>
+                </a:solidFill>
+                <a:latin typeface="맑은 고딕" pitchFamily="50" charset="-127"/>
+                <a:ea typeface="맑은 고딕" pitchFamily="50" charset="-127"/>
+              </a:rPr>
+              <a:t>main.html</a:t>
             </a:r>
             <a:endParaRPr lang="ko-KR" altLang="en-US" sz="1300" dirty="0">
               <a:solidFill>

</xml_diff>